<commit_message>
Update Lecture 3 - IBAMR Associated Files (.vertex, .spring, etc).pptx
</commit_message>
<xml_diff>
--- a/IBAMR Lectures/Lecture 3 - IBAMR Associated Files (.vertex, .spring, etc).pptx
+++ b/IBAMR Lectures/Lecture 3 - IBAMR Associated Files (.vertex, .spring, etc).pptx
@@ -13938,10 +13938,9 @@
               <a:buNone/>
             </a:pPr>
             <a:r>
-              <a:rPr lang="en-US" dirty="0" smtClean="0"/>
+              <a:rPr lang="en-US" dirty="0"/>
               <a:t>Rubber band example</a:t>
             </a:r>
-            <a:endParaRPr lang="en-US" dirty="0"/>
           </a:p>
         </p:txBody>
       </p:sp>
@@ -13961,37 +13960,29 @@
           <a:lstStyle/>
           <a:p>
             <a:r>
-              <a:rPr lang="en-US" dirty="0" smtClean="0"/>
+              <a:rPr lang="en-US" dirty="0"/>
               <a:t>An example is available on </a:t>
             </a:r>
             <a:r>
-              <a:rPr lang="en-US" dirty="0" err="1" smtClean="0"/>
+              <a:rPr lang="en-US" dirty="0" err="1"/>
               <a:t>github</a:t>
             </a:r>
             <a:r>
-              <a:rPr lang="en-US" dirty="0" smtClean="0"/>
+              <a:rPr lang="en-US" dirty="0"/>
               <a:t>:</a:t>
             </a:r>
           </a:p>
           <a:p>
             <a:pPr lvl="1"/>
             <a:r>
-              <a:rPr lang="en-US" dirty="0" smtClean="0"/>
+              <a:rPr lang="en-US" dirty="0"/>
               <a:t> 3-Example_2Drubber_band</a:t>
             </a:r>
           </a:p>
           <a:p>
             <a:r>
-              <a:rPr lang="en-US" dirty="0" smtClean="0"/>
-              <a:t>The MATLAB code creates the .vertex and .spring files for a </a:t>
-            </a:r>
-            <a:r>
-              <a:rPr lang="en-US" dirty="0" smtClean="0"/>
-              <a:t>rubber band </a:t>
-            </a:r>
-            <a:r>
-              <a:rPr lang="en-US" dirty="0" smtClean="0"/>
-              <a:t>that resists stretching.</a:t>
+              <a:rPr lang="en-US" dirty="0"/>
+              <a:t>The MATLAB code creates the .vertex and .spring files for a rubber band that resists stretching.</a:t>
             </a:r>
           </a:p>
           <a:p>
@@ -14067,12 +14058,8 @@
               <a:buNone/>
             </a:pPr>
             <a:r>
-              <a:rPr lang="en" dirty="0" smtClean="0"/>
-              <a:t>HW </a:t>
-            </a:r>
-            <a:r>
               <a:rPr lang="en" dirty="0"/>
-              <a:t>- Your own rubber band</a:t>
+              <a:t>HW - Your own rubber band</a:t>
             </a:r>
             <a:endParaRPr dirty="0"/>
           </a:p>
@@ -14335,10 +14322,10 @@
               <a:buNone/>
             </a:pPr>
             <a:r>
-              <a:rPr lang="en"/>
+              <a:rPr lang="en" dirty="0"/>
               <a:t>L = 1;                             		% length of computational domain (m)</a:t>
             </a:r>
-            <a:endParaRPr/>
+            <a:endParaRPr dirty="0"/>
           </a:p>
           <a:p>
             <a:pPr marL="0" lvl="0" indent="0" algn="l" rtl="0">
@@ -14351,10 +14338,10 @@
               <a:buNone/>
             </a:pPr>
             <a:r>
-              <a:rPr lang="en"/>
+              <a:rPr lang="en" dirty="0"/>
               <a:t>N = 512;                            		% number of Cartesian grid meshwidths at the finest level of the AMR grid</a:t>
             </a:r>
-            <a:endParaRPr/>
+            <a:endParaRPr dirty="0"/>
           </a:p>
           <a:p>
             <a:pPr marL="0" lvl="0" indent="0" algn="l" rtl="0">
@@ -14367,10 +14354,10 @@
               <a:buNone/>
             </a:pPr>
             <a:r>
-              <a:rPr lang="en"/>
+              <a:rPr lang="en" dirty="0"/>
               <a:t>dx = L/N;                           		% Cartesian mesh width (m)</a:t>
             </a:r>
-            <a:endParaRPr/>
+            <a:endParaRPr dirty="0"/>
           </a:p>
           <a:p>
             <a:pPr marL="0" lvl="0" indent="0" algn="l" rtl="0">
@@ -14383,10 +14370,10 @@
               <a:buNone/>
             </a:pPr>
             <a:r>
-              <a:rPr lang="en"/>
+              <a:rPr lang="en" dirty="0"/>
               <a:t> </a:t>
             </a:r>
-            <a:endParaRPr/>
+            <a:endParaRPr dirty="0"/>
           </a:p>
           <a:p>
             <a:pPr marL="0" lvl="0" indent="0" algn="l" rtl="0">
@@ -14399,10 +14386,10 @@
               <a:buNone/>
             </a:pPr>
             <a:r>
-              <a:rPr lang="en"/>
+              <a:rPr lang="en" dirty="0"/>
               <a:t>radius = 0.1;                      		% radius of band (m)</a:t>
             </a:r>
-            <a:endParaRPr/>
+            <a:endParaRPr dirty="0"/>
           </a:p>
           <a:p>
             <a:pPr marL="0" lvl="0" indent="0" algn="l" rtl="0">
@@ -14415,10 +14402,10 @@
               <a:buNone/>
             </a:pPr>
             <a:r>
-              <a:rPr lang="en"/>
+              <a:rPr lang="en" dirty="0"/>
               <a:t>epsilon = 0.005;                    		% deformation in the x-direction</a:t>
             </a:r>
-            <a:endParaRPr/>
+            <a:endParaRPr dirty="0"/>
           </a:p>
           <a:p>
             <a:pPr marL="0" lvl="0" indent="0" algn="l" rtl="0">
@@ -14431,10 +14418,10 @@
               <a:buNone/>
             </a:pPr>
             <a:r>
-              <a:rPr lang="en"/>
+              <a:rPr lang="en" dirty="0"/>
               <a:t>band_length = 2*pi*radius;          	% rubber band length (m)</a:t>
             </a:r>
-            <a:endParaRPr/>
+            <a:endParaRPr dirty="0"/>
           </a:p>
           <a:p>
             <a:pPr marL="0" lvl="0" indent="0" algn="l" rtl="0">
@@ -14447,10 +14434,10 @@
               <a:buNone/>
             </a:pPr>
             <a:r>
-              <a:rPr lang="en"/>
+              <a:rPr lang="en" dirty="0"/>
               <a:t>npts = ceil(2*(band_length/L)*N);   % number of points along the rubber band</a:t>
             </a:r>
-            <a:endParaRPr/>
+            <a:endParaRPr dirty="0"/>
           </a:p>
           <a:p>
             <a:pPr marL="0" lvl="0" indent="0" algn="l" rtl="0">
@@ -14463,10 +14450,10 @@
               <a:buNone/>
             </a:pPr>
             <a:r>
-              <a:rPr lang="en"/>
+              <a:rPr lang="en" dirty="0"/>
               <a:t>ds = band_length/(npts);            	% physical distance between neighboring Lagrangian mesh points (m)</a:t>
             </a:r>
-            <a:endParaRPr/>
+            <a:endParaRPr dirty="0"/>
           </a:p>
           <a:p>
             <a:pPr marL="0" lvl="0" indent="0" algn="l" rtl="0">
@@ -14479,10 +14466,10 @@
               <a:buNone/>
             </a:pPr>
             <a:r>
-              <a:rPr lang="en"/>
+              <a:rPr lang="en" dirty="0"/>
               <a:t>dtheta = 2*pi/npts;</a:t>
             </a:r>
-            <a:endParaRPr/>
+            <a:endParaRPr dirty="0"/>
           </a:p>
           <a:p>
             <a:pPr marL="0" lvl="0" indent="0" algn="l" rtl="0">
@@ -14495,10 +14482,10 @@
               <a:buNone/>
             </a:pPr>
             <a:r>
-              <a:rPr lang="en"/>
+              <a:rPr lang="en" dirty="0"/>
               <a:t> </a:t>
             </a:r>
-            <a:endParaRPr/>
+            <a:endParaRPr dirty="0"/>
           </a:p>
           <a:p>
             <a:pPr marL="0" lvl="0" indent="0" algn="l" rtl="0">
@@ -14511,10 +14498,10 @@
               <a:buNone/>
             </a:pPr>
             <a:r>
-              <a:rPr lang="en"/>
+              <a:rPr lang="en" dirty="0"/>
               <a:t>mesh_name = 'rubber_band_';     	% structure name</a:t>
             </a:r>
-            <a:endParaRPr/>
+            <a:endParaRPr dirty="0"/>
           </a:p>
           <a:p>
             <a:pPr marL="0" lvl="0" indent="0" algn="l" rtl="0">
@@ -14527,10 +14514,10 @@
               <a:buNone/>
             </a:pPr>
             <a:r>
-              <a:rPr lang="en"/>
+              <a:rPr lang="en" dirty="0"/>
               <a:t> </a:t>
             </a:r>
-            <a:endParaRPr/>
+            <a:endParaRPr dirty="0"/>
           </a:p>
           <a:p>
             <a:pPr marL="0" lvl="0" indent="0" algn="l" rtl="0">
@@ -14543,10 +14530,10 @@
               <a:buNone/>
             </a:pPr>
             <a:r>
-              <a:rPr lang="en"/>
+              <a:rPr lang="en" dirty="0"/>
               <a:t>kappa_spring = 2.0e3;               	% spring constant (Newton)</a:t>
             </a:r>
-            <a:endParaRPr/>
+            <a:endParaRPr dirty="0"/>
           </a:p>
           <a:p>
             <a:pPr marL="0" lvl="0" indent="0" algn="l" rtl="0">
@@ -14559,10 +14546,10 @@
               <a:buNone/>
             </a:pPr>
             <a:r>
-              <a:rPr lang="en"/>
+              <a:rPr lang="en" dirty="0"/>
               <a:t>kappa_beam = 5.0e-3;                	% beam stiffness constant (Newton m^2)</a:t>
             </a:r>
-            <a:endParaRPr/>
+            <a:endParaRPr dirty="0"/>
           </a:p>
           <a:p>
             <a:pPr marL="0" lvl="0" indent="0" algn="l" rtl="0">
@@ -14574,7 +14561,7 @@
               </a:spcAft>
               <a:buNone/>
             </a:pPr>
-            <a:endParaRPr/>
+            <a:endParaRPr dirty="0"/>
           </a:p>
         </p:txBody>
       </p:sp>
@@ -14685,10 +14672,10 @@
               <a:buNone/>
             </a:pPr>
             <a:r>
-              <a:rPr lang="en"/>
+              <a:rPr lang="en" dirty="0"/>
               <a:t> </a:t>
             </a:r>
-            <a:endParaRPr/>
+            <a:endParaRPr dirty="0"/>
           </a:p>
           <a:p>
             <a:pPr marL="0" lvl="0" indent="0" algn="l" rtl="0">
@@ -14701,10 +14688,10 @@
               <a:buNone/>
             </a:pPr>
             <a:r>
-              <a:rPr lang="en"/>
+              <a:rPr lang="en" dirty="0"/>
               <a:t>%%%%%%%%%%%%%%%%%%%%%%%%%%%%%%%%%%%%%%%%%%%%%%%%%%%%%%%%%%%%%%%%%%%%%%%%%%%%%%%%</a:t>
             </a:r>
-            <a:endParaRPr/>
+            <a:endParaRPr dirty="0"/>
           </a:p>
           <a:p>
             <a:pPr marL="0" lvl="0" indent="0" algn="l" rtl="0">
@@ -14717,10 +14704,10 @@
               <a:buNone/>
             </a:pPr>
             <a:r>
-              <a:rPr lang="en"/>
+              <a:rPr lang="en" dirty="0"/>
               <a:t> </a:t>
             </a:r>
-            <a:endParaRPr/>
+            <a:endParaRPr dirty="0"/>
           </a:p>
           <a:p>
             <a:pPr marL="0" lvl="0" indent="0" algn="l" rtl="0">
@@ -14733,10 +14720,10 @@
               <a:buNone/>
             </a:pPr>
             <a:r>
-              <a:rPr lang="en"/>
+              <a:rPr lang="en" dirty="0"/>
               <a:t>% Write out the vertex information</a:t>
             </a:r>
-            <a:endParaRPr/>
+            <a:endParaRPr dirty="0"/>
           </a:p>
           <a:p>
             <a:pPr marL="0" lvl="0" indent="0" algn="l" rtl="0">
@@ -14749,10 +14736,10 @@
               <a:buNone/>
             </a:pPr>
             <a:r>
-              <a:rPr lang="en"/>
+              <a:rPr lang="en" dirty="0"/>
               <a:t>vertex_fid = fopen([mesh_name num2str(N) '.vertex'], 'w');</a:t>
             </a:r>
-            <a:endParaRPr/>
+            <a:endParaRPr dirty="0"/>
           </a:p>
           <a:p>
             <a:pPr marL="0" lvl="0" indent="0" algn="l" rtl="0">
@@ -14765,10 +14752,10 @@
               <a:buNone/>
             </a:pPr>
             <a:r>
-              <a:rPr lang="en"/>
+              <a:rPr lang="en" dirty="0"/>
               <a:t> </a:t>
             </a:r>
-            <a:endParaRPr/>
+            <a:endParaRPr dirty="0"/>
           </a:p>
           <a:p>
             <a:pPr marL="0" lvl="0" indent="0" algn="l" rtl="0">
@@ -14781,10 +14768,10 @@
               <a:buNone/>
             </a:pPr>
             <a:r>
-              <a:rPr lang="en"/>
+              <a:rPr lang="en" dirty="0"/>
               <a:t>fprintf(vertex_fid, '%d\n', npts);</a:t>
             </a:r>
-            <a:endParaRPr/>
+            <a:endParaRPr dirty="0"/>
           </a:p>
           <a:p>
             <a:pPr marL="0" lvl="0" indent="0" algn="l" rtl="0">
@@ -14797,10 +14784,10 @@
               <a:buNone/>
             </a:pPr>
             <a:r>
-              <a:rPr lang="en"/>
+              <a:rPr lang="en" dirty="0"/>
               <a:t> </a:t>
             </a:r>
-            <a:endParaRPr/>
+            <a:endParaRPr dirty="0"/>
           </a:p>
           <a:p>
             <a:pPr marL="0" lvl="0" indent="0" algn="l" rtl="0">
@@ -14813,10 +14800,10 @@
               <a:buNone/>
             </a:pPr>
             <a:r>
-              <a:rPr lang="en"/>
+              <a:rPr lang="en" dirty="0"/>
               <a:t>for s = 0:npts-1</a:t>
             </a:r>
-            <a:endParaRPr/>
+            <a:endParaRPr dirty="0"/>
           </a:p>
           <a:p>
             <a:pPr marL="0" lvl="0" indent="0" algn="l" rtl="0">
@@ -14829,10 +14816,10 @@
               <a:buNone/>
             </a:pPr>
             <a:r>
-              <a:rPr lang="en"/>
+              <a:rPr lang="en" dirty="0"/>
               <a:t>   X(1) = (radius+epsilon)*sin(s*dtheta);</a:t>
             </a:r>
-            <a:endParaRPr/>
+            <a:endParaRPr dirty="0"/>
           </a:p>
           <a:p>
             <a:pPr marL="0" lvl="0" indent="0" algn="l" rtl="0">
@@ -14845,10 +14832,10 @@
               <a:buNone/>
             </a:pPr>
             <a:r>
-              <a:rPr lang="en"/>
+              <a:rPr lang="en" dirty="0"/>
               <a:t>   X(2) = radius*cos(s*dtheta);</a:t>
             </a:r>
-            <a:endParaRPr/>
+            <a:endParaRPr dirty="0"/>
           </a:p>
           <a:p>
             <a:pPr marL="0" lvl="0" indent="0" algn="l" rtl="0">
@@ -14861,10 +14848,10 @@
               <a:buNone/>
             </a:pPr>
             <a:r>
-              <a:rPr lang="en"/>
+              <a:rPr lang="en" dirty="0"/>
               <a:t>   fprintf(vertex_fid, '%1.16e %1.16e\n', X(1), X(2));</a:t>
             </a:r>
-            <a:endParaRPr/>
+            <a:endParaRPr dirty="0"/>
           </a:p>
           <a:p>
             <a:pPr marL="0" lvl="0" indent="0" algn="l" rtl="0">
@@ -14877,10 +14864,10 @@
               <a:buNone/>
             </a:pPr>
             <a:r>
-              <a:rPr lang="en"/>
+              <a:rPr lang="en" dirty="0"/>
               <a:t>end</a:t>
             </a:r>
-            <a:endParaRPr/>
+            <a:endParaRPr dirty="0"/>
           </a:p>
           <a:p>
             <a:pPr marL="0" lvl="0" indent="0" algn="l" rtl="0">
@@ -14893,10 +14880,10 @@
               <a:buNone/>
             </a:pPr>
             <a:r>
-              <a:rPr lang="en"/>
+              <a:rPr lang="en" dirty="0"/>
               <a:t> </a:t>
             </a:r>
-            <a:endParaRPr/>
+            <a:endParaRPr dirty="0"/>
           </a:p>
           <a:p>
             <a:pPr marL="0" lvl="0" indent="0" algn="l" rtl="0">
@@ -14909,10 +14896,10 @@
               <a:buNone/>
             </a:pPr>
             <a:r>
-              <a:rPr lang="en"/>
+              <a:rPr lang="en" dirty="0"/>
               <a:t>fclose(vertex_fid);</a:t>
             </a:r>
-            <a:endParaRPr/>
+            <a:endParaRPr dirty="0"/>
           </a:p>
           <a:p>
             <a:pPr marL="0" lvl="0" indent="0" algn="l" rtl="0">
@@ -14925,10 +14912,10 @@
               <a:buNone/>
             </a:pPr>
             <a:r>
-              <a:rPr lang="en"/>
+              <a:rPr lang="en" dirty="0"/>
               <a:t> </a:t>
             </a:r>
-            <a:endParaRPr/>
+            <a:endParaRPr dirty="0"/>
           </a:p>
           <a:p>
             <a:pPr marL="0" lvl="0" indent="0" algn="l" rtl="0">
@@ -14941,10 +14928,10 @@
               <a:buNone/>
             </a:pPr>
             <a:r>
-              <a:rPr lang="en"/>
+              <a:rPr lang="en" dirty="0"/>
               <a:t>%%%%%%%%%%%%%%%%%%%%%%%%%%%%%%%%%%%%%%%%%%%%%%%%%%%%%%%%%%%%%%%%%%%%%%%%%%%%%%%%</a:t>
             </a:r>
-            <a:endParaRPr/>
+            <a:endParaRPr dirty="0"/>
           </a:p>
         </p:txBody>
       </p:sp>
@@ -15050,10 +15037,10 @@
               <a:buNone/>
             </a:pPr>
             <a:r>
-              <a:rPr lang="en"/>
+              <a:rPr lang="en" dirty="0"/>
               <a:t>644</a:t>
             </a:r>
-            <a:endParaRPr/>
+            <a:endParaRPr dirty="0"/>
           </a:p>
           <a:p>
             <a:pPr marL="0" lvl="0" indent="0" algn="l" rtl="0">
@@ -15066,10 +15053,10 @@
               <a:buNone/>
             </a:pPr>
             <a:r>
-              <a:rPr lang="en"/>
+              <a:rPr lang="en" dirty="0"/>
               <a:t>0.0000000000000000e+00 1.0000000000000001e-01</a:t>
             </a:r>
-            <a:endParaRPr/>
+            <a:endParaRPr dirty="0"/>
           </a:p>
           <a:p>
             <a:pPr marL="0" lvl="0" indent="0" algn="l" rtl="0">
@@ -15082,10 +15069,10 @@
               <a:buNone/>
             </a:pPr>
             <a:r>
-              <a:rPr lang="en"/>
+              <a:rPr lang="en" dirty="0"/>
               <a:t>1.0244161346221071e-03 9.9995240574191152e-02</a:t>
             </a:r>
-            <a:endParaRPr/>
+            <a:endParaRPr dirty="0"/>
           </a:p>
           <a:p>
             <a:pPr marL="0" lvl="0" indent="0" algn="l" rtl="0">
@@ -15098,10 +15085,10 @@
               <a:buNone/>
             </a:pPr>
             <a:r>
-              <a:rPr lang="en"/>
+              <a:rPr lang="en" dirty="0"/>
               <a:t>2.0487347565924115e-03 9.9980962749807278e-02</a:t>
             </a:r>
-            <a:endParaRPr/>
+            <a:endParaRPr dirty="0"/>
           </a:p>
           <a:p>
             <a:pPr marL="0" lvl="0" indent="0" algn="l" rtl="0">
@@ -15114,10 +15101,10 @@
               <a:buNone/>
             </a:pPr>
             <a:r>
-              <a:rPr lang="en"/>
+              <a:rPr lang="en" dirty="0"/>
               <a:t>3.0728583625411962e-03 9.9957167885933298e-02</a:t>
             </a:r>
-            <a:endParaRPr/>
+            <a:endParaRPr dirty="0"/>
           </a:p>
           <a:p>
             <a:pPr marL="0" lvl="0" indent="0" algn="l" rtl="0">
@@ -15130,10 +15117,10 @@
               <a:buNone/>
             </a:pPr>
             <a:r>
-              <a:rPr lang="en"/>
+              <a:rPr lang="en" dirty="0"/>
               <a:t>4.0966894676620277e-03 9.9923858247566999e-02</a:t>
             </a:r>
-            <a:endParaRPr/>
+            <a:endParaRPr dirty="0"/>
           </a:p>
           <a:p>
             <a:pPr marL="0" lvl="0" indent="0" algn="l" rtl="0">
@@ -15146,10 +15133,10 @@
               <a:buNone/>
             </a:pPr>
             <a:r>
-              <a:rPr lang="en"/>
+              <a:rPr lang="en" dirty="0"/>
               <a:t>5.1201306149911948e-03 9.9881037005403420e-02</a:t>
             </a:r>
-            <a:endParaRPr/>
+            <a:endParaRPr dirty="0"/>
           </a:p>
           <a:p>
             <a:pPr marL="0" lvl="0" indent="0" algn="l" rtl="0">
@@ -15162,10 +15149,10 @@
               <a:buNone/>
             </a:pPr>
             <a:r>
-              <a:rPr lang="en"/>
+              <a:rPr lang="en" dirty="0"/>
               <a:t>6.1430843846844874e-03 9.9828708235533081e-02</a:t>
             </a:r>
-            <a:endParaRPr/>
+            <a:endParaRPr dirty="0"/>
           </a:p>
           <a:p>
             <a:pPr marL="0" lvl="0" indent="0" algn="l" rtl="0">
@@ -15178,10 +15165,10 @@
               <a:buNone/>
             </a:pPr>
             <a:r>
-              <a:rPr lang="en"/>
+              <a:rPr lang="en" dirty="0"/>
               <a:t>7.1654534032904536e-03 9.9766876919053921e-02</a:t>
             </a:r>
-            <a:endParaRPr/>
+            <a:endParaRPr dirty="0"/>
           </a:p>
           <a:p>
             <a:pPr marL="0" lvl="0" indent="0" algn="l" rtl="0">
@@ -15194,10 +15181,10 @@
               <a:buNone/>
             </a:pPr>
             <a:r>
-              <a:rPr lang="en"/>
+              <a:rPr lang="en" dirty="0"/>
               <a:t>8.1871403530192222e-03 9.9695548941597226e-02</a:t>
             </a:r>
-            <a:endParaRPr/>
+            <a:endParaRPr dirty="0"/>
           </a:p>
           <a:p>
             <a:pPr marL="0" lvl="0" indent="0" algn="l" rtl="0">
@@ -15210,10 +15197,10 @@
               <a:buNone/>
             </a:pPr>
             <a:r>
-              <a:rPr lang="en"/>
+              <a:rPr lang="en" dirty="0"/>
               <a:t>9.2080479810060564e-03 9.9614731092767334e-02</a:t>
             </a:r>
-            <a:endParaRPr/>
+            <a:endParaRPr dirty="0"/>
           </a:p>
           <a:p>
             <a:pPr marL="0" lvl="0" indent="0" algn="l" rtl="0">
@@ -15226,10 +15213,10 @@
               <a:buNone/>
             </a:pPr>
             <a:r>
-              <a:rPr lang="en"/>
+              <a:rPr lang="en" dirty="0"/>
               <a:t>1.0228079108568690e-02 9.9524431065495328e-02</a:t>
             </a:r>
-            <a:endParaRPr/>
+            <a:endParaRPr dirty="0"/>
           </a:p>
           <a:p>
             <a:pPr marL="0" lvl="0" indent="0" algn="l" rtl="0">
@@ -15242,10 +15229,10 @@
               <a:buNone/>
             </a:pPr>
             <a:r>
-              <a:rPr lang="en"/>
+              <a:rPr lang="en" dirty="0"/>
               <a:t>1.1247136640457638e-02 9.9424657455306847e-02</a:t>
             </a:r>
-            <a:endParaRPr/>
+            <a:endParaRPr dirty="0"/>
           </a:p>
           <a:p>
             <a:pPr marL="0" lvl="0" indent="0" algn="l" rtl="0">
@@ -15258,10 +15245,10 @@
               <a:buNone/>
             </a:pPr>
             <a:r>
-              <a:rPr lang="en"/>
+              <a:rPr lang="en" dirty="0"/>
               <a:t>1.2265123574098539e-02 9.9315419759503781e-02</a:t>
             </a:r>
-            <a:endParaRPr/>
+            <a:endParaRPr dirty="0"/>
           </a:p>
           <a:p>
             <a:pPr marL="0" lvl="0" indent="0" algn="l" rtl="0">
@@ -15274,10 +15261,10 @@
               <a:buNone/>
             </a:pPr>
             <a:r>
-              <a:rPr lang="en"/>
+              <a:rPr lang="en" dirty="0"/>
               <a:t>1.3281943008825695e-02 9.9196728376260312e-02</a:t>
             </a:r>
-            <a:endParaRPr/>
+            <a:endParaRPr dirty="0"/>
           </a:p>
           <a:p>
             <a:pPr marL="0" lvl="0" indent="0" algn="l" rtl="0">
@@ -15290,10 +15277,10 @@
               <a:buNone/>
             </a:pPr>
             <a:r>
-              <a:rPr lang="en"/>
+              <a:rPr lang="en" dirty="0"/>
               <a:t>1.4297498155105894e-02 9.9068594603633084e-02</a:t>
             </a:r>
-            <a:endParaRPr/>
+            <a:endParaRPr dirty="0"/>
           </a:p>
           <a:p>
             <a:pPr marL="0" lvl="0" indent="0" algn="l" rtl="0">
@@ -15306,10 +15293,10 @@
               <a:buNone/>
             </a:pPr>
             <a:r>
-              <a:rPr lang="en"/>
+              <a:rPr lang="en" dirty="0"/>
               <a:t>1.5311692343751664e-02 9.8931030638485795e-02</a:t>
             </a:r>
-            <a:endParaRPr/>
+            <a:endParaRPr dirty="0"/>
           </a:p>
           <a:p>
             <a:pPr marL="0" lvl="0" indent="0" algn="l" rtl="0">
@@ -15322,10 +15309,10 @@
               <a:buNone/>
             </a:pPr>
             <a:r>
-              <a:rPr lang="en"/>
+              <a:rPr lang="en" dirty="0"/>
               <a:t>1.6324429035123069e-02 9.8784049575328159e-02</a:t>
             </a:r>
-            <a:endParaRPr/>
+            <a:endParaRPr dirty="0"/>
           </a:p>
           <a:p>
             <a:pPr marL="0" lvl="0" indent="0" algn="l" rtl="0">
@@ -15338,10 +15325,10 @@
               <a:buNone/>
             </a:pPr>
             <a:r>
-              <a:rPr lang="en"/>
+              <a:rPr lang="en" dirty="0"/>
               <a:t>1.7335611828317186e-02 9.8627665405069495e-02</a:t>
             </a:r>
-            <a:endParaRPr/>
+            <a:endParaRPr dirty="0"/>
           </a:p>
           <a:p>
             <a:pPr marL="0" lvl="0" indent="0" algn="l" rtl="0">
@@ -15354,10 +15341,10 @@
               <a:buNone/>
             </a:pPr>
             <a:r>
-              <a:rPr lang="en"/>
+              <a:rPr lang="en" dirty="0"/>
               <a:t>1.8345144470344348e-02 9.8461893013686907e-02</a:t>
             </a:r>
-            <a:endParaRPr/>
+            <a:endParaRPr dirty="0"/>
           </a:p>
           <a:p>
             <a:pPr marL="0" lvl="0" indent="0" algn="l" rtl="0">
@@ -15369,7 +15356,7 @@
               </a:spcAft>
               <a:buNone/>
             </a:pPr>
-            <a:endParaRPr/>
+            <a:endParaRPr dirty="0"/>
           </a:p>
         </p:txBody>
       </p:sp>
@@ -15480,10 +15467,10 @@
               <a:buNone/>
             </a:pPr>
             <a:r>
-              <a:rPr lang="en"/>
+              <a:rPr lang="en" dirty="0"/>
               <a:t>%%%%%%%%%%%%%%%%%%%%%%%%%%%%%%%%%%%%%%%%%%%%%%%%%%%%%%%%%%%%%%%%%%%%%%%%%%%%%%%%</a:t>
             </a:r>
-            <a:endParaRPr/>
+            <a:endParaRPr dirty="0"/>
           </a:p>
           <a:p>
             <a:pPr marL="0" lvl="0" indent="0" algn="l" rtl="0">
@@ -15496,10 +15483,10 @@
               <a:buNone/>
             </a:pPr>
             <a:r>
-              <a:rPr lang="en"/>
+              <a:rPr lang="en" dirty="0"/>
               <a:t> </a:t>
             </a:r>
-            <a:endParaRPr/>
+            <a:endParaRPr dirty="0"/>
           </a:p>
           <a:p>
             <a:pPr marL="0" lvl="0" indent="0" algn="l" rtl="0">
@@ -15512,10 +15499,10 @@
               <a:buNone/>
             </a:pPr>
             <a:r>
-              <a:rPr lang="en"/>
+              <a:rPr lang="en" dirty="0"/>
               <a:t>% Write out the spring information</a:t>
             </a:r>
-            <a:endParaRPr/>
+            <a:endParaRPr dirty="0"/>
           </a:p>
           <a:p>
             <a:pPr marL="0" lvl="0" indent="0" algn="l" rtl="0">
@@ -15528,10 +15515,10 @@
               <a:buNone/>
             </a:pPr>
             <a:r>
-              <a:rPr lang="en"/>
+              <a:rPr lang="en" dirty="0"/>
               <a:t>spring_fid = fopen([mesh_name num2str(N) '.spring'], 'w');</a:t>
             </a:r>
-            <a:endParaRPr/>
+            <a:endParaRPr dirty="0"/>
           </a:p>
           <a:p>
             <a:pPr marL="0" lvl="0" indent="0" algn="l" rtl="0">
@@ -15544,10 +15531,10 @@
               <a:buNone/>
             </a:pPr>
             <a:r>
-              <a:rPr lang="en"/>
+              <a:rPr lang="en" dirty="0"/>
               <a:t> </a:t>
             </a:r>
-            <a:endParaRPr/>
+            <a:endParaRPr dirty="0"/>
           </a:p>
           <a:p>
             <a:pPr marL="0" lvl="0" indent="0" algn="l" rtl="0">
@@ -15560,10 +15547,10 @@
               <a:buNone/>
             </a:pPr>
             <a:r>
-              <a:rPr lang="en"/>
+              <a:rPr lang="en" dirty="0"/>
               <a:t>fprintf(spring_fid, '%d\n', npts-1);</a:t>
             </a:r>
-            <a:endParaRPr/>
+            <a:endParaRPr dirty="0"/>
           </a:p>
           <a:p>
             <a:pPr marL="0" lvl="0" indent="0" algn="l" rtl="0">
@@ -15576,10 +15563,10 @@
               <a:buNone/>
             </a:pPr>
             <a:r>
-              <a:rPr lang="en"/>
+              <a:rPr lang="en" dirty="0"/>
               <a:t> </a:t>
             </a:r>
-            <a:endParaRPr/>
+            <a:endParaRPr dirty="0"/>
           </a:p>
           <a:p>
             <a:pPr marL="0" lvl="0" indent="0" algn="l" rtl="0">
@@ -15592,10 +15579,10 @@
               <a:buNone/>
             </a:pPr>
             <a:r>
-              <a:rPr lang="en"/>
+              <a:rPr lang="en" dirty="0"/>
               <a:t>for s = 0:npts-2</a:t>
             </a:r>
-            <a:endParaRPr/>
+            <a:endParaRPr dirty="0"/>
           </a:p>
           <a:p>
             <a:pPr marL="0" lvl="0" indent="0" algn="l" rtl="0">
@@ -15608,10 +15595,10 @@
               <a:buNone/>
             </a:pPr>
             <a:r>
-              <a:rPr lang="en"/>
+              <a:rPr lang="en" dirty="0"/>
               <a:t>   fprintf(spring_fid, '%d %d %1.16e %1.16e\n', s, s+1, kappa_spring*ds/(ds^2), ds);</a:t>
             </a:r>
-            <a:endParaRPr/>
+            <a:endParaRPr dirty="0"/>
           </a:p>
           <a:p>
             <a:pPr marL="0" lvl="0" indent="0" algn="l" rtl="0">
@@ -15624,10 +15611,10 @@
               <a:buNone/>
             </a:pPr>
             <a:r>
-              <a:rPr lang="en"/>
+              <a:rPr lang="en" dirty="0"/>
               <a:t>end</a:t>
             </a:r>
-            <a:endParaRPr/>
+            <a:endParaRPr dirty="0"/>
           </a:p>
           <a:p>
             <a:pPr marL="0" lvl="0" indent="0" algn="l" rtl="0">
@@ -15640,10 +15627,10 @@
               <a:buNone/>
             </a:pPr>
             <a:r>
-              <a:rPr lang="en"/>
+              <a:rPr lang="en" dirty="0"/>
               <a:t> </a:t>
             </a:r>
-            <a:endParaRPr/>
+            <a:endParaRPr dirty="0"/>
           </a:p>
           <a:p>
             <a:pPr marL="0" lvl="0" indent="0" algn="l" rtl="0">
@@ -15656,10 +15643,10 @@
               <a:buNone/>
             </a:pPr>
             <a:r>
-              <a:rPr lang="en"/>
+              <a:rPr lang="en" dirty="0"/>
               <a:t>fclose(spring_fid);</a:t>
             </a:r>
-            <a:endParaRPr/>
+            <a:endParaRPr dirty="0"/>
           </a:p>
           <a:p>
             <a:pPr marL="0" lvl="0" indent="0" algn="l" rtl="0">
@@ -15672,10 +15659,10 @@
               <a:buNone/>
             </a:pPr>
             <a:r>
-              <a:rPr lang="en"/>
+              <a:rPr lang="en" dirty="0"/>
               <a:t> </a:t>
             </a:r>
-            <a:endParaRPr/>
+            <a:endParaRPr dirty="0"/>
           </a:p>
           <a:p>
             <a:pPr marL="0" lvl="0" indent="0" algn="l" rtl="0">
@@ -15688,10 +15675,10 @@
               <a:buNone/>
             </a:pPr>
             <a:r>
-              <a:rPr lang="en"/>
+              <a:rPr lang="en" dirty="0"/>
               <a:t>%%%%%%%%%%%%%%%%%%%%%%%%%%%%%%%%%%%%%%%%%%%%%%%%%%%%%%%%%%%%%%%%%%%%%%%%%%%%%%%%</a:t>
             </a:r>
-            <a:endParaRPr/>
+            <a:endParaRPr dirty="0"/>
           </a:p>
         </p:txBody>
       </p:sp>
@@ -15802,10 +15789,10 @@
               <a:buNone/>
             </a:pPr>
             <a:r>
-              <a:rPr lang="en"/>
+              <a:rPr lang="en" dirty="0"/>
               <a:t>643</a:t>
             </a:r>
-            <a:endParaRPr/>
+            <a:endParaRPr dirty="0"/>
           </a:p>
           <a:p>
             <a:pPr marL="0" lvl="0" indent="0" algn="l" rtl="0">
@@ -15818,10 +15805,10 @@
               <a:buNone/>
             </a:pPr>
             <a:r>
-              <a:rPr lang="en"/>
+              <a:rPr lang="en" dirty="0"/>
               <a:t>0 1 2.0499156670236122e+06 9.7564989241919039e-04</a:t>
             </a:r>
-            <a:endParaRPr/>
+            <a:endParaRPr dirty="0"/>
           </a:p>
           <a:p>
             <a:pPr marL="0" lvl="0" indent="0" algn="l" rtl="0">
@@ -15834,10 +15821,10 @@
               <a:buNone/>
             </a:pPr>
             <a:r>
-              <a:rPr lang="en"/>
+              <a:rPr lang="en" dirty="0"/>
               <a:t>1 2 2.0499156670236122e+06 9.7564989241919039e-04</a:t>
             </a:r>
-            <a:endParaRPr/>
+            <a:endParaRPr dirty="0"/>
           </a:p>
           <a:p>
             <a:pPr marL="0" lvl="0" indent="0" algn="l" rtl="0">
@@ -15850,10 +15837,10 @@
               <a:buNone/>
             </a:pPr>
             <a:r>
-              <a:rPr lang="en"/>
+              <a:rPr lang="en" dirty="0"/>
               <a:t>2 3 2.0499156670236122e+06 9.7564989241919039e-04</a:t>
             </a:r>
-            <a:endParaRPr/>
+            <a:endParaRPr dirty="0"/>
           </a:p>
           <a:p>
             <a:pPr marL="0" lvl="0" indent="0" algn="l" rtl="0">
@@ -15866,10 +15853,10 @@
               <a:buNone/>
             </a:pPr>
             <a:r>
-              <a:rPr lang="en"/>
+              <a:rPr lang="en" dirty="0"/>
               <a:t>3 4 2.0499156670236122e+06 9.7564989241919039e-04</a:t>
             </a:r>
-            <a:endParaRPr/>
+            <a:endParaRPr dirty="0"/>
           </a:p>
           <a:p>
             <a:pPr marL="0" lvl="0" indent="0" algn="l" rtl="0">
@@ -15882,10 +15869,10 @@
               <a:buNone/>
             </a:pPr>
             <a:r>
-              <a:rPr lang="en"/>
+              <a:rPr lang="en" dirty="0"/>
               <a:t>4 5 2.0499156670236122e+06 9.7564989241919039e-04</a:t>
             </a:r>
-            <a:endParaRPr/>
+            <a:endParaRPr dirty="0"/>
           </a:p>
           <a:p>
             <a:pPr marL="0" lvl="0" indent="0" algn="l" rtl="0">
@@ -15898,10 +15885,10 @@
               <a:buNone/>
             </a:pPr>
             <a:r>
-              <a:rPr lang="en"/>
+              <a:rPr lang="en" dirty="0"/>
               <a:t>5 6 2.0499156670236122e+06 9.7564989241919039e-04</a:t>
             </a:r>
-            <a:endParaRPr/>
+            <a:endParaRPr dirty="0"/>
           </a:p>
           <a:p>
             <a:pPr marL="0" lvl="0" indent="0" algn="l" rtl="0">
@@ -15914,10 +15901,10 @@
               <a:buNone/>
             </a:pPr>
             <a:r>
-              <a:rPr lang="en"/>
+              <a:rPr lang="en" dirty="0"/>
               <a:t>6 7 2.0499156670236122e+06 9.7564989241919039e-04</a:t>
             </a:r>
-            <a:endParaRPr/>
+            <a:endParaRPr dirty="0"/>
           </a:p>
           <a:p>
             <a:pPr marL="0" lvl="0" indent="0" algn="l" rtl="0">
@@ -15930,10 +15917,10 @@
               <a:buNone/>
             </a:pPr>
             <a:r>
-              <a:rPr lang="en"/>
+              <a:rPr lang="en" dirty="0"/>
               <a:t>7 8 2.0499156670236122e+06 9.7564989241919039e-04</a:t>
             </a:r>
-            <a:endParaRPr/>
+            <a:endParaRPr dirty="0"/>
           </a:p>
           <a:p>
             <a:pPr marL="0" lvl="0" indent="0" algn="l" rtl="0">
@@ -15946,10 +15933,10 @@
               <a:buNone/>
             </a:pPr>
             <a:r>
-              <a:rPr lang="en"/>
+              <a:rPr lang="en" dirty="0"/>
               <a:t>8 9 2.0499156670236122e+06 9.7564989241919039e-04</a:t>
             </a:r>
-            <a:endParaRPr/>
+            <a:endParaRPr dirty="0"/>
           </a:p>
           <a:p>
             <a:pPr marL="0" lvl="0" indent="0" algn="l" rtl="0">
@@ -15962,10 +15949,10 @@
               <a:buNone/>
             </a:pPr>
             <a:r>
-              <a:rPr lang="en"/>
+              <a:rPr lang="en" dirty="0"/>
               <a:t>9 10 2.0499156670236122e+06 9.7564989241919039e-04</a:t>
             </a:r>
-            <a:endParaRPr/>
+            <a:endParaRPr dirty="0"/>
           </a:p>
           <a:p>
             <a:pPr marL="0" lvl="0" indent="0" algn="l" rtl="0">
@@ -15978,10 +15965,10 @@
               <a:buNone/>
             </a:pPr>
             <a:r>
-              <a:rPr lang="en"/>
+              <a:rPr lang="en" dirty="0"/>
               <a:t>10 11 2.0499156670236122e+06 9.7564989241919039e-04</a:t>
             </a:r>
-            <a:endParaRPr/>
+            <a:endParaRPr dirty="0"/>
           </a:p>
           <a:p>
             <a:pPr marL="0" lvl="0" indent="0" algn="l" rtl="0">
@@ -15994,10 +15981,10 @@
               <a:buNone/>
             </a:pPr>
             <a:r>
-              <a:rPr lang="en"/>
+              <a:rPr lang="en" dirty="0"/>
               <a:t>11 12 2.0499156670236122e+06 9.7564989241919039e-04</a:t>
             </a:r>
-            <a:endParaRPr/>
+            <a:endParaRPr dirty="0"/>
           </a:p>
           <a:p>
             <a:pPr marL="0" lvl="0" indent="0" algn="l" rtl="0">
@@ -16010,10 +15997,10 @@
               <a:buNone/>
             </a:pPr>
             <a:r>
-              <a:rPr lang="en"/>
+              <a:rPr lang="en" dirty="0"/>
               <a:t>12 13 2.0499156670236122e+06 9.7564989241919039e-04</a:t>
             </a:r>
-            <a:endParaRPr/>
+            <a:endParaRPr dirty="0"/>
           </a:p>
           <a:p>
             <a:pPr marL="0" lvl="0" indent="0" algn="l" rtl="0">
@@ -16026,10 +16013,10 @@
               <a:buNone/>
             </a:pPr>
             <a:r>
-              <a:rPr lang="en"/>
+              <a:rPr lang="en" dirty="0"/>
               <a:t>13 14 2.0499156670236122e+06 9.7564989241919039e-04</a:t>
             </a:r>
-            <a:endParaRPr/>
+            <a:endParaRPr dirty="0"/>
           </a:p>
           <a:p>
             <a:pPr marL="0" lvl="0" indent="0" algn="l" rtl="0">
@@ -16042,10 +16029,10 @@
               <a:buNone/>
             </a:pPr>
             <a:r>
-              <a:rPr lang="en"/>
+              <a:rPr lang="en" dirty="0"/>
               <a:t>14 15 2.0499156670236122e+06 9.7564989241919039e-04</a:t>
             </a:r>
-            <a:endParaRPr/>
+            <a:endParaRPr dirty="0"/>
           </a:p>
           <a:p>
             <a:pPr marL="0" lvl="0" indent="0" algn="l" rtl="0">
@@ -16058,10 +16045,10 @@
               <a:buNone/>
             </a:pPr>
             <a:r>
-              <a:rPr lang="en"/>
+              <a:rPr lang="en" dirty="0"/>
               <a:t>15 16 2.0499156670236122e+06 9.7564989241919039e-04</a:t>
             </a:r>
-            <a:endParaRPr/>
+            <a:endParaRPr dirty="0"/>
           </a:p>
           <a:p>
             <a:pPr marL="0" lvl="0" indent="0" algn="l" rtl="0">
@@ -16074,10 +16061,10 @@
               <a:buNone/>
             </a:pPr>
             <a:r>
-              <a:rPr lang="en"/>
+              <a:rPr lang="en" dirty="0"/>
               <a:t>16 17 2.0499156670236122e+06 9.7564989241919039e-04</a:t>
             </a:r>
-            <a:endParaRPr/>
+            <a:endParaRPr dirty="0"/>
           </a:p>
           <a:p>
             <a:pPr marL="0" lvl="0" indent="0" algn="l" rtl="0">
@@ -16090,10 +16077,10 @@
               <a:buNone/>
             </a:pPr>
             <a:r>
-              <a:rPr lang="en"/>
+              <a:rPr lang="en" dirty="0"/>
               <a:t>17 18 2.0499156670236122e+06 9.7564989241919039e-04</a:t>
             </a:r>
-            <a:endParaRPr/>
+            <a:endParaRPr dirty="0"/>
           </a:p>
           <a:p>
             <a:pPr marL="0" lvl="0" indent="0" algn="l" rtl="0">
@@ -16106,10 +16093,10 @@
               <a:buNone/>
             </a:pPr>
             <a:r>
-              <a:rPr lang="en"/>
+              <a:rPr lang="en" dirty="0"/>
               <a:t>18 19 2.0499156670236122e+06 9.7564989241919039e-04</a:t>
             </a:r>
-            <a:endParaRPr/>
+            <a:endParaRPr dirty="0"/>
           </a:p>
           <a:p>
             <a:pPr marL="0" lvl="0" indent="0" algn="l" rtl="0">
@@ -16122,10 +16109,10 @@
               <a:buNone/>
             </a:pPr>
             <a:r>
-              <a:rPr lang="en"/>
+              <a:rPr lang="en" dirty="0"/>
               <a:t>19 20 2.0499156670236122e+06 9.7564989241919039e-04</a:t>
             </a:r>
-            <a:endParaRPr/>
+            <a:endParaRPr dirty="0"/>
           </a:p>
           <a:p>
             <a:pPr marL="0" lvl="0" indent="0" algn="l" rtl="0">
@@ -16138,10 +16125,10 @@
               <a:buNone/>
             </a:pPr>
             <a:r>
-              <a:rPr lang="en"/>
+              <a:rPr lang="en" dirty="0"/>
               <a:t>20 21 2.0499156670236122e+06 9.7564989241919039e-04</a:t>
             </a:r>
-            <a:endParaRPr/>
+            <a:endParaRPr dirty="0"/>
           </a:p>
         </p:txBody>
       </p:sp>
@@ -17323,7 +17310,7 @@
               <a:buNone/>
             </a:pPr>
             <a:r>
-              <a:rPr lang="en" sz="2000" b="1" i="0" u="none" strike="noStrike" cap="none">
+              <a:rPr lang="en" sz="2000" b="1" i="0" u="none" strike="noStrike" cap="none" dirty="0">
                 <a:solidFill>
                   <a:srgbClr val="000000"/>
                 </a:solidFill>
@@ -17334,7 +17321,7 @@
               </a:rPr>
               <a:t>Vertex file format</a:t>
             </a:r>
-            <a:endParaRPr sz="1800" b="0" i="0" u="none" strike="noStrike" cap="none">
+            <a:endParaRPr sz="1800" b="0" i="0" u="none" strike="noStrike" cap="none" dirty="0">
               <a:solidFill>
                 <a:schemeClr val="dk1"/>
               </a:solidFill>
@@ -17354,7 +17341,7 @@
               </a:spcAft>
               <a:buNone/>
             </a:pPr>
-            <a:endParaRPr sz="1800" b="0" i="0" u="none" strike="noStrike" cap="none">
+            <a:endParaRPr sz="1800" b="0" i="0" u="none" strike="noStrike" cap="none" dirty="0">
               <a:solidFill>
                 <a:schemeClr val="dk1"/>
               </a:solidFill>
@@ -17379,7 +17366,7 @@
               <a:buNone/>
             </a:pPr>
             <a:r>
-              <a:rPr lang="en" sz="2000" b="0" i="0" u="none" strike="noStrike" cap="none">
+              <a:rPr lang="en" sz="2000" b="0" i="0" u="none" strike="noStrike" cap="none" dirty="0">
                 <a:solidFill>
                   <a:srgbClr val="000000"/>
                 </a:solidFill>
@@ -17390,7 +17377,7 @@
               </a:rPr>
               <a:t>Vertex input files end with the extension ".vertex" and have the following format for two-dimensional models:</a:t>
             </a:r>
-            <a:endParaRPr sz="1800" b="0" i="0" u="none" strike="noStrike" cap="none">
+            <a:endParaRPr sz="1800" b="0" i="0" u="none" strike="noStrike" cap="none" dirty="0">
               <a:solidFill>
                 <a:schemeClr val="dk1"/>
               </a:solidFill>
@@ -17410,7 +17397,7 @@
               </a:spcAft>
               <a:buNone/>
             </a:pPr>
-            <a:endParaRPr sz="1800" b="0" i="0" u="none" strike="noStrike" cap="none">
+            <a:endParaRPr sz="1800" b="0" i="0" u="none" strike="noStrike" cap="none" dirty="0">
               <a:solidFill>
                 <a:schemeClr val="dk1"/>
               </a:solidFill>
@@ -17435,7 +17422,7 @@
               <a:buNone/>
             </a:pPr>
             <a:r>
-              <a:rPr lang="en" sz="1800" b="0" i="0" u="none" strike="noStrike" cap="none">
+              <a:rPr lang="en" sz="1800" b="0" i="0" u="none" strike="noStrike" cap="none" dirty="0">
                 <a:solidFill>
                   <a:srgbClr val="000000"/>
                 </a:solidFill>
@@ -17446,7 +17433,7 @@
               </a:rPr>
               <a:t>N 			# number of vertices in the file </a:t>
             </a:r>
-            <a:endParaRPr sz="1800" b="0" i="0" u="none" strike="noStrike" cap="none">
+            <a:endParaRPr sz="1800" b="0" i="0" u="none" strike="noStrike" cap="none" dirty="0">
               <a:solidFill>
                 <a:schemeClr val="dk1"/>
               </a:solidFill>
@@ -17471,7 +17458,7 @@
               <a:buNone/>
             </a:pPr>
             <a:r>
-              <a:rPr lang="en" sz="1800" b="0" i="0" u="none" strike="noStrike" cap="none">
+              <a:rPr lang="en" sz="1800" b="0" i="0" u="none" strike="noStrike" cap="none" dirty="0">
                 <a:solidFill>
                   <a:srgbClr val="000000"/>
                 </a:solidFill>
@@ -17482,7 +17469,7 @@
               </a:rPr>
               <a:t>x_0 y_0 		# (x,y)-coordinates of vertex 0 </a:t>
             </a:r>
-            <a:endParaRPr sz="1800" b="0" i="0" u="none" strike="noStrike" cap="none">
+            <a:endParaRPr sz="1800" b="0" i="0" u="none" strike="noStrike" cap="none" dirty="0">
               <a:solidFill>
                 <a:schemeClr val="dk1"/>
               </a:solidFill>
@@ -17507,7 +17494,7 @@
               <a:buNone/>
             </a:pPr>
             <a:r>
-              <a:rPr lang="en" sz="1800" b="0" i="0" u="none" strike="noStrike" cap="none">
+              <a:rPr lang="en" sz="1800" b="0" i="0" u="none" strike="noStrike" cap="none" dirty="0">
                 <a:solidFill>
                   <a:srgbClr val="000000"/>
                 </a:solidFill>
@@ -17518,7 +17505,7 @@
               </a:rPr>
               <a:t>x_1 y_1 		# (x,y)-coordinates of vertex 1 </a:t>
             </a:r>
-            <a:endParaRPr sz="1800" b="0" i="0" u="none" strike="noStrike" cap="none">
+            <a:endParaRPr sz="1800" b="0" i="0" u="none" strike="noStrike" cap="none" dirty="0">
               <a:solidFill>
                 <a:schemeClr val="dk1"/>
               </a:solidFill>
@@ -17543,7 +17530,7 @@
               <a:buNone/>
             </a:pPr>
             <a:r>
-              <a:rPr lang="en" sz="1800" b="0" i="0" u="none" strike="noStrike" cap="none">
+              <a:rPr lang="en" sz="1800" b="0" i="0" u="none" strike="noStrike" cap="none" dirty="0">
                 <a:solidFill>
                   <a:srgbClr val="000000"/>
                 </a:solidFill>
@@ -17554,7 +17541,7 @@
               </a:rPr>
               <a:t>... </a:t>
             </a:r>
-            <a:endParaRPr sz="1800" b="0" i="0" u="none" strike="noStrike" cap="none">
+            <a:endParaRPr sz="1800" b="0" i="0" u="none" strike="noStrike" cap="none" dirty="0">
               <a:solidFill>
                 <a:schemeClr val="dk1"/>
               </a:solidFill>
@@ -17579,7 +17566,7 @@
               <a:buNone/>
             </a:pPr>
             <a:r>
-              <a:rPr lang="en" sz="1800" b="0" i="0" u="none" strike="noStrike" cap="none">
+              <a:rPr lang="en" sz="1800" b="0" i="0" u="none" strike="noStrike" cap="none" dirty="0">
                 <a:solidFill>
                   <a:srgbClr val="000000"/>
                 </a:solidFill>
@@ -17590,7 +17577,7 @@
               </a:rPr>
               <a:t>x_{N-1} y_{N-1} 	# (x,y)-coordinates of vertex N-1</a:t>
             </a:r>
-            <a:endParaRPr sz="1800" b="0" i="0" u="none" strike="noStrike" cap="none">
+            <a:endParaRPr sz="1800" b="0" i="0" u="none" strike="noStrike" cap="none" dirty="0">
               <a:solidFill>
                 <a:schemeClr val="dk1"/>
               </a:solidFill>
@@ -17912,7 +17899,7 @@
               <a:buNone/>
             </a:pPr>
             <a:r>
-              <a:rPr lang="en" sz="1800" b="1" i="0" u="none" strike="noStrike" cap="none">
+              <a:rPr lang="en" sz="1800" b="1" i="0" u="none" strike="noStrike" cap="none" dirty="0">
                 <a:solidFill>
                   <a:srgbClr val="000000"/>
                 </a:solidFill>
@@ -17923,7 +17910,7 @@
               </a:rPr>
               <a:t>Spring file format</a:t>
             </a:r>
-            <a:endParaRPr sz="1800" b="0" i="0" u="none" strike="noStrike" cap="none">
+            <a:endParaRPr sz="1800" b="0" i="0" u="none" strike="noStrike" cap="none" dirty="0">
               <a:solidFill>
                 <a:schemeClr val="dk1"/>
               </a:solidFill>
@@ -17943,7 +17930,7 @@
               </a:spcAft>
               <a:buNone/>
             </a:pPr>
-            <a:endParaRPr sz="1800" b="0" i="0" u="none" strike="noStrike" cap="none">
+            <a:endParaRPr sz="1800" b="0" i="0" u="none" strike="noStrike" cap="none" dirty="0">
               <a:solidFill>
                 <a:schemeClr val="dk1"/>
               </a:solidFill>
@@ -17968,7 +17955,7 @@
               <a:buNone/>
             </a:pPr>
             <a:r>
-              <a:rPr lang="en" sz="1800" b="0" i="0" u="none" strike="noStrike" cap="none">
+              <a:rPr lang="en" sz="1800" b="0" i="0" u="none" strike="noStrike" cap="none" dirty="0">
                 <a:solidFill>
                   <a:srgbClr val="000000"/>
                 </a:solidFill>
@@ -17979,7 +17966,7 @@
               </a:rPr>
               <a:t>Spring input files end with the extension ".spring" and have the following format:</a:t>
             </a:r>
-            <a:endParaRPr sz="1800" b="0" i="0" u="none" strike="noStrike" cap="none">
+            <a:endParaRPr sz="1800" b="0" i="0" u="none" strike="noStrike" cap="none" dirty="0">
               <a:solidFill>
                 <a:schemeClr val="dk1"/>
               </a:solidFill>
@@ -17999,7 +17986,7 @@
               </a:spcAft>
               <a:buNone/>
             </a:pPr>
-            <a:endParaRPr sz="1800" b="0" i="0" u="none" strike="noStrike" cap="none">
+            <a:endParaRPr sz="1800" b="0" i="0" u="none" strike="noStrike" cap="none" dirty="0">
               <a:solidFill>
                 <a:schemeClr val="dk1"/>
               </a:solidFill>
@@ -18024,7 +18011,7 @@
               <a:buNone/>
             </a:pPr>
             <a:r>
-              <a:rPr lang="en" sz="1600" b="0" i="0" u="none" strike="noStrike" cap="none">
+              <a:rPr lang="en" sz="1600" b="0" i="0" u="none" strike="noStrike" cap="none" dirty="0">
                 <a:solidFill>
                   <a:srgbClr val="000000"/>
                 </a:solidFill>
@@ -18035,7 +18022,7 @@
               </a:rPr>
               <a:t>M # number of links in the file </a:t>
             </a:r>
-            <a:endParaRPr sz="1800" b="0" i="0" u="none" strike="noStrike" cap="none">
+            <a:endParaRPr sz="1800" b="0" i="0" u="none" strike="noStrike" cap="none" dirty="0">
               <a:solidFill>
                 <a:schemeClr val="dk1"/>
               </a:solidFill>
@@ -18060,7 +18047,7 @@
               <a:buNone/>
             </a:pPr>
             <a:r>
-              <a:rPr lang="en" sz="1600" b="0" i="0" u="none" strike="noStrike" cap="none">
+              <a:rPr lang="en" sz="1600" b="0" i="0" u="none" strike="noStrike" cap="none" dirty="0">
                 <a:solidFill>
                   <a:srgbClr val="000000"/>
                 </a:solidFill>
@@ -18071,7 +18058,7 @@
               </a:rPr>
               <a:t>i_0 j_0 kappa_0 length_0 fcn_idx_0 </a:t>
             </a:r>
-            <a:endParaRPr sz="1800" b="0" i="0" u="none" strike="noStrike" cap="none">
+            <a:endParaRPr sz="1800" b="0" i="0" u="none" strike="noStrike" cap="none" dirty="0">
               <a:solidFill>
                 <a:schemeClr val="dk1"/>
               </a:solidFill>
@@ -18096,7 +18083,7 @@
               <a:buNone/>
             </a:pPr>
             <a:r>
-              <a:rPr lang="en" sz="1600" b="0" i="0" u="none" strike="noStrike" cap="none">
+              <a:rPr lang="en" sz="1600" b="0" i="0" u="none" strike="noStrike" cap="none" dirty="0">
                 <a:solidFill>
                   <a:srgbClr val="000000"/>
                 </a:solidFill>
@@ -18107,7 +18094,7 @@
               </a:rPr>
               <a:t># first vertex index, second vertex index, spring constant, </a:t>
             </a:r>
-            <a:endParaRPr sz="1800" b="0" i="0" u="none" strike="noStrike" cap="none">
+            <a:endParaRPr sz="1800" b="0" i="0" u="none" strike="noStrike" cap="none" dirty="0">
               <a:solidFill>
                 <a:schemeClr val="dk1"/>
               </a:solidFill>
@@ -18132,7 +18119,7 @@
               <a:buNone/>
             </a:pPr>
             <a:r>
-              <a:rPr lang="en" sz="1600" b="0" i="0" u="none" strike="noStrike" cap="none">
+              <a:rPr lang="en" sz="1600" b="0" i="0" u="none" strike="noStrike" cap="none" dirty="0">
                 <a:solidFill>
                   <a:srgbClr val="000000"/>
                 </a:solidFill>
@@ -18143,7 +18130,7 @@
               </a:rPr>
               <a:t># rest length, spring function index </a:t>
             </a:r>
-            <a:endParaRPr sz="1800" b="0" i="0" u="none" strike="noStrike" cap="none">
+            <a:endParaRPr sz="1800" b="0" i="0" u="none" strike="noStrike" cap="none" dirty="0">
               <a:solidFill>
                 <a:schemeClr val="dk1"/>
               </a:solidFill>
@@ -18168,7 +18155,7 @@
               <a:buNone/>
             </a:pPr>
             <a:r>
-              <a:rPr lang="en" sz="1600" b="0" i="0" u="none" strike="noStrike" cap="none">
+              <a:rPr lang="en" sz="1600" b="0" i="0" u="none" strike="noStrike" cap="none" dirty="0">
                 <a:solidFill>
                   <a:srgbClr val="000000"/>
                 </a:solidFill>
@@ -18179,7 +18166,7 @@
               </a:rPr>
               <a:t>i_1 j_1 kappa_1 length_1 fcn_idx_1 </a:t>
             </a:r>
-            <a:endParaRPr sz="1800" b="0" i="0" u="none" strike="noStrike" cap="none">
+            <a:endParaRPr sz="1800" b="0" i="0" u="none" strike="noStrike" cap="none" dirty="0">
               <a:solidFill>
                 <a:schemeClr val="dk1"/>
               </a:solidFill>
@@ -18204,7 +18191,7 @@
               <a:buNone/>
             </a:pPr>
             <a:r>
-              <a:rPr lang="en" sz="1600" b="0" i="0" u="none" strike="noStrike" cap="none">
+              <a:rPr lang="en" sz="1600" b="0" i="0" u="none" strike="noStrike" cap="none" dirty="0">
                 <a:solidFill>
                   <a:srgbClr val="000000"/>
                 </a:solidFill>
@@ -18215,7 +18202,7 @@
               </a:rPr>
               <a:t>i_2 j_2 kappa_2 length_2 fcn_idx_2 </a:t>
             </a:r>
-            <a:endParaRPr sz="1800" b="0" i="0" u="none" strike="noStrike" cap="none">
+            <a:endParaRPr sz="1800" b="0" i="0" u="none" strike="noStrike" cap="none" dirty="0">
               <a:solidFill>
                 <a:schemeClr val="dk1"/>
               </a:solidFill>
@@ -18240,7 +18227,7 @@
               <a:buNone/>
             </a:pPr>
             <a:r>
-              <a:rPr lang="en" sz="1600" b="0" i="0" u="none" strike="noStrike" cap="none">
+              <a:rPr lang="en" sz="1600" b="0" i="0" u="none" strike="noStrike" cap="none" dirty="0">
                 <a:solidFill>
                   <a:srgbClr val="000000"/>
                 </a:solidFill>
@@ -18251,7 +18238,7 @@
               </a:rPr>
               <a:t>... </a:t>
             </a:r>
-            <a:endParaRPr sz="1800" b="0" i="0" u="none" strike="noStrike" cap="none">
+            <a:endParaRPr sz="1800" b="0" i="0" u="none" strike="noStrike" cap="none" dirty="0">
               <a:solidFill>
                 <a:schemeClr val="dk1"/>
               </a:solidFill>
@@ -18271,7 +18258,7 @@
               </a:spcAft>
               <a:buNone/>
             </a:pPr>
-            <a:endParaRPr sz="1800" b="0" i="0" u="none" strike="noStrike" cap="none">
+            <a:endParaRPr sz="1800" b="0" i="0" u="none" strike="noStrike" cap="none" dirty="0">
               <a:solidFill>
                 <a:schemeClr val="dk1"/>
               </a:solidFill>
@@ -18296,7 +18283,7 @@
               <a:buNone/>
             </a:pPr>
             <a:r>
-              <a:rPr lang="en" sz="1800" b="1" i="0" u="none" strike="noStrike" cap="none">
+              <a:rPr lang="en" sz="1800" b="1" i="0" u="none" strike="noStrike" cap="none" dirty="0">
                 <a:solidFill>
                   <a:srgbClr val="000000"/>
                 </a:solidFill>
@@ -18307,7 +18294,7 @@
               </a:rPr>
               <a:t>Note:</a:t>
             </a:r>
-            <a:endParaRPr sz="1800" b="0" i="0" u="none" strike="noStrike" cap="none">
+            <a:endParaRPr sz="1800" b="0" i="0" u="none" strike="noStrike" cap="none" dirty="0">
               <a:solidFill>
                 <a:schemeClr val="dk1"/>
               </a:solidFill>
@@ -18332,7 +18319,7 @@
               <a:buNone/>
             </a:pPr>
             <a:r>
-              <a:rPr lang="en" sz="1800" b="0" i="0" u="none" strike="noStrike" cap="none">
+              <a:rPr lang="en" sz="1800" b="0" i="0" u="none" strike="noStrike" cap="none" dirty="0">
                 <a:solidFill>
                   <a:srgbClr val="000000"/>
                 </a:solidFill>
@@ -18343,7 +18330,7 @@
               </a:rPr>
               <a:t>There is no restriction on the number of springs that may be associated with any particular node of the Lagrangian mesh.</a:t>
             </a:r>
-            <a:endParaRPr sz="1800" b="0" i="0" u="none" strike="noStrike" cap="none">
+            <a:endParaRPr sz="1800" b="0" i="0" u="none" strike="noStrike" cap="none" dirty="0">
               <a:solidFill>
                 <a:schemeClr val="dk1"/>
               </a:solidFill>
@@ -18368,7 +18355,7 @@
               <a:buNone/>
             </a:pPr>
             <a:r>
-              <a:rPr lang="en" sz="1800" b="0" i="0" u="none" strike="noStrike" cap="none">
+              <a:rPr lang="en" sz="1800" b="0" i="0" u="none" strike="noStrike" cap="none" dirty="0">
                 <a:solidFill>
                   <a:srgbClr val="000000"/>
                 </a:solidFill>
@@ -18380,7 +18367,7 @@
               <a:t>The rest length and force function index are </a:t>
             </a:r>
             <a:r>
-              <a:rPr lang="en" sz="1800" b="0" i="1" u="none" strike="noStrike" cap="none">
+              <a:rPr lang="en" sz="1800" b="0" i="1" u="none" strike="noStrike" cap="none" dirty="0">
                 <a:solidFill>
                   <a:srgbClr val="000000"/>
                 </a:solidFill>
@@ -18392,7 +18379,7 @@
               <a:t>optional</a:t>
             </a:r>
             <a:r>
-              <a:rPr lang="en" sz="1800" b="0" i="0" u="none" strike="noStrike" cap="none">
+              <a:rPr lang="en" sz="1800" b="0" i="0" u="none" strike="noStrike" cap="none" dirty="0">
                 <a:solidFill>
                   <a:srgbClr val="000000"/>
                 </a:solidFill>
@@ -18404,7 +18391,7 @@
               <a:t> values. If they are not provided, by default the rest length will be set to the value </a:t>
             </a:r>
             <a:r>
-              <a:rPr lang="en" sz="1800" b="0" i="1" u="none" strike="noStrike" cap="none">
+              <a:rPr lang="en" sz="1800" b="0" i="1" u="none" strike="noStrike" cap="none" dirty="0">
                 <a:solidFill>
                   <a:srgbClr val="000000"/>
                 </a:solidFill>
@@ -18416,7 +18403,7 @@
               <a:t>0.0</a:t>
             </a:r>
             <a:r>
-              <a:rPr lang="en" sz="1800" b="0" i="0" u="none" strike="noStrike" cap="none">
+              <a:rPr lang="en" sz="1800" b="0" i="0" u="none" strike="noStrike" cap="none" dirty="0">
                 <a:solidFill>
                   <a:srgbClr val="000000"/>
                 </a:solidFill>
@@ -18428,7 +18415,7 @@
               <a:t> and the force function index will be set to </a:t>
             </a:r>
             <a:r>
-              <a:rPr lang="en" sz="1800" b="0" i="1" u="none" strike="noStrike" cap="none">
+              <a:rPr lang="en" sz="1800" b="0" i="1" u="none" strike="noStrike" cap="none" dirty="0">
                 <a:solidFill>
                   <a:srgbClr val="000000"/>
                 </a:solidFill>
@@ -18440,7 +18427,7 @@
               <a:t>0</a:t>
             </a:r>
             <a:r>
-              <a:rPr lang="en" sz="1800" b="0" i="0" u="none" strike="noStrike" cap="none">
+              <a:rPr lang="en" sz="1800" b="0" i="0" u="none" strike="noStrike" cap="none" dirty="0">
                 <a:solidFill>
                   <a:srgbClr val="000000"/>
                 </a:solidFill>
@@ -18451,7 +18438,7 @@
               </a:rPr>
               <a:t>. This corresponds to a linear spring with zero rest length.</a:t>
             </a:r>
-            <a:endParaRPr sz="1800" b="0" i="0" u="none" strike="noStrike" cap="none">
+            <a:endParaRPr sz="1800" b="0" i="0" u="none" strike="noStrike" cap="none" dirty="0">
               <a:solidFill>
                 <a:schemeClr val="dk1"/>
               </a:solidFill>
@@ -18471,7 +18458,7 @@
               </a:spcAft>
               <a:buNone/>
             </a:pPr>
-            <a:endParaRPr sz="1800" b="0" i="0" u="none" strike="noStrike" cap="none">
+            <a:endParaRPr sz="1800" b="0" i="0" u="none" strike="noStrike" cap="none" dirty="0">
               <a:solidFill>
                 <a:schemeClr val="dk1"/>
               </a:solidFill>
@@ -18491,7 +18478,7 @@
               </a:spcAft>
               <a:buNone/>
             </a:pPr>
-            <a:endParaRPr sz="1800" b="0" i="0" u="none" strike="noStrike" cap="none">
+            <a:endParaRPr sz="1800" b="0" i="0" u="none" strike="noStrike" cap="none" dirty="0">
               <a:solidFill>
                 <a:schemeClr val="dk1"/>
               </a:solidFill>
@@ -18536,7 +18523,7 @@
         </p:nvSpPr>
         <p:spPr>
           <a:xfrm>
-            <a:off x="381000" y="787875"/>
+            <a:off x="527108" y="813041"/>
             <a:ext cx="8382000" cy="3359100"/>
           </a:xfrm>
           <a:prstGeom prst="rect">
@@ -18569,7 +18556,7 @@
               <a:buNone/>
             </a:pPr>
             <a:r>
-              <a:rPr lang="en" sz="1800" b="1" i="0" u="none" strike="noStrike" cap="none">
+              <a:rPr lang="en" sz="1800" b="1" i="0" u="none" strike="noStrike" cap="none" dirty="0">
                 <a:solidFill>
                   <a:srgbClr val="000000"/>
                 </a:solidFill>
@@ -18580,7 +18567,7 @@
               </a:rPr>
               <a:t>Beam file format</a:t>
             </a:r>
-            <a:endParaRPr sz="1800" b="0" i="0" u="none" strike="noStrike" cap="none">
+            <a:endParaRPr sz="1800" b="0" i="0" u="none" strike="noStrike" cap="none" dirty="0">
               <a:solidFill>
                 <a:schemeClr val="dk1"/>
               </a:solidFill>
@@ -18600,7 +18587,7 @@
               </a:spcAft>
               <a:buNone/>
             </a:pPr>
-            <a:endParaRPr sz="1800" b="0" i="0" u="none" strike="noStrike" cap="none">
+            <a:endParaRPr sz="1800" b="0" i="0" u="none" strike="noStrike" cap="none" dirty="0">
               <a:solidFill>
                 <a:schemeClr val="dk1"/>
               </a:solidFill>
@@ -18625,7 +18612,7 @@
               <a:buNone/>
             </a:pPr>
             <a:r>
-              <a:rPr lang="en" sz="1800" b="0" i="0" u="none" strike="noStrike" cap="none">
+              <a:rPr lang="en" sz="1800" b="0" i="0" u="none" strike="noStrike" cap="none" dirty="0">
                 <a:solidFill>
                   <a:srgbClr val="000000"/>
                 </a:solidFill>
@@ -18636,7 +18623,7 @@
               </a:rPr>
               <a:t>Beam input files end with the extension ".beam" and have the following format:</a:t>
             </a:r>
-            <a:endParaRPr sz="1800" b="0" i="0" u="none" strike="noStrike" cap="none">
+            <a:endParaRPr sz="1800" b="0" i="0" u="none" strike="noStrike" cap="none" dirty="0">
               <a:solidFill>
                 <a:schemeClr val="dk1"/>
               </a:solidFill>
@@ -18656,7 +18643,7 @@
               </a:spcAft>
               <a:buNone/>
             </a:pPr>
-            <a:endParaRPr sz="1800" b="0" i="0" u="none" strike="noStrike" cap="none">
+            <a:endParaRPr sz="1800" b="0" i="0" u="none" strike="noStrike" cap="none" dirty="0">
               <a:solidFill>
                 <a:schemeClr val="dk1"/>
               </a:solidFill>
@@ -18681,7 +18668,7 @@
               <a:buNone/>
             </a:pPr>
             <a:r>
-              <a:rPr lang="en" sz="1600" b="0" i="0" u="none" strike="noStrike" cap="none">
+              <a:rPr lang="en" sz="1600" b="0" i="0" u="none" strike="noStrike" cap="none" dirty="0">
                 <a:solidFill>
                   <a:srgbClr val="000000"/>
                 </a:solidFill>
@@ -18692,7 +18679,7 @@
               </a:rPr>
               <a:t>M # number of beams in the file </a:t>
             </a:r>
-            <a:endParaRPr sz="1800" b="0" i="0" u="none" strike="noStrike" cap="none">
+            <a:endParaRPr sz="1800" b="0" i="0" u="none" strike="noStrike" cap="none" dirty="0">
               <a:solidFill>
                 <a:schemeClr val="dk1"/>
               </a:solidFill>
@@ -18717,7 +18704,7 @@
               <a:buNone/>
             </a:pPr>
             <a:r>
-              <a:rPr lang="en" sz="1600" b="0" i="0" u="none" strike="noStrike" cap="none">
+              <a:rPr lang="en" sz="1600" b="0" i="0" u="none" strike="noStrike" cap="none" dirty="0">
                 <a:solidFill>
                   <a:srgbClr val="000000"/>
                 </a:solidFill>
@@ -18728,7 +18715,7 @@
               </a:rPr>
               <a:t>i_0 j_0 k_0 kappa_0 </a:t>
             </a:r>
-            <a:endParaRPr sz="1800" b="0" i="0" u="none" strike="noStrike" cap="none">
+            <a:endParaRPr sz="1800" b="0" i="0" u="none" strike="noStrike" cap="none" dirty="0">
               <a:solidFill>
                 <a:schemeClr val="dk1"/>
               </a:solidFill>
@@ -18753,7 +18740,7 @@
               <a:buNone/>
             </a:pPr>
             <a:r>
-              <a:rPr lang="en" sz="1600" b="0" i="0" u="none" strike="noStrike" cap="none">
+              <a:rPr lang="en" sz="1600" b="0" i="0" u="none" strike="noStrike" cap="none" dirty="0">
                 <a:solidFill>
                   <a:srgbClr val="000000"/>
                 </a:solidFill>
@@ -18764,7 +18751,7 @@
               </a:rPr>
               <a:t># first vertex index, second vertex index, third vertex index, </a:t>
             </a:r>
-            <a:endParaRPr sz="1800" b="0" i="0" u="none" strike="noStrike" cap="none">
+            <a:endParaRPr sz="1800" b="0" i="0" u="none" strike="noStrike" cap="none" dirty="0">
               <a:solidFill>
                 <a:schemeClr val="dk1"/>
               </a:solidFill>
@@ -18789,7 +18776,7 @@
               <a:buNone/>
             </a:pPr>
             <a:r>
-              <a:rPr lang="en" sz="1600" b="0" i="0" u="none" strike="noStrike" cap="none">
+              <a:rPr lang="en" sz="1600" b="0" i="0" u="none" strike="noStrike" cap="none" dirty="0">
                 <a:solidFill>
                   <a:srgbClr val="000000"/>
                 </a:solidFill>
@@ -18800,7 +18787,7 @@
               </a:rPr>
               <a:t># bending rigidity </a:t>
             </a:r>
-            <a:endParaRPr sz="1800" b="0" i="0" u="none" strike="noStrike" cap="none">
+            <a:endParaRPr sz="1800" b="0" i="0" u="none" strike="noStrike" cap="none" dirty="0">
               <a:solidFill>
                 <a:schemeClr val="dk1"/>
               </a:solidFill>
@@ -18825,7 +18812,7 @@
               <a:buNone/>
             </a:pPr>
             <a:r>
-              <a:rPr lang="en" sz="1600" b="0" i="0" u="none" strike="noStrike" cap="none">
+              <a:rPr lang="en" sz="1600" b="0" i="0" u="none" strike="noStrike" cap="none" dirty="0">
                 <a:solidFill>
                   <a:srgbClr val="000000"/>
                 </a:solidFill>
@@ -18836,7 +18823,7 @@
               </a:rPr>
               <a:t>i_1 j_1 k_1 kappa_1 </a:t>
             </a:r>
-            <a:endParaRPr sz="1800" b="0" i="0" u="none" strike="noStrike" cap="none">
+            <a:endParaRPr sz="1800" b="0" i="0" u="none" strike="noStrike" cap="none" dirty="0">
               <a:solidFill>
                 <a:schemeClr val="dk1"/>
               </a:solidFill>
@@ -18861,7 +18848,7 @@
               <a:buNone/>
             </a:pPr>
             <a:r>
-              <a:rPr lang="en" sz="1600" b="0" i="0" u="none" strike="noStrike" cap="none">
+              <a:rPr lang="en" sz="1600" b="0" i="0" u="none" strike="noStrike" cap="none" dirty="0">
                 <a:solidFill>
                   <a:srgbClr val="000000"/>
                 </a:solidFill>
@@ -18872,7 +18859,7 @@
               </a:rPr>
               <a:t># first vertex index, second vertex index, third vertex index, </a:t>
             </a:r>
-            <a:endParaRPr sz="1800" b="0" i="0" u="none" strike="noStrike" cap="none">
+            <a:endParaRPr sz="1800" b="0" i="0" u="none" strike="noStrike" cap="none" dirty="0">
               <a:solidFill>
                 <a:schemeClr val="dk1"/>
               </a:solidFill>
@@ -18897,7 +18884,7 @@
               <a:buNone/>
             </a:pPr>
             <a:r>
-              <a:rPr lang="en" sz="1600" b="0" i="0" u="none" strike="noStrike" cap="none">
+              <a:rPr lang="en" sz="1600" b="0" i="0" u="none" strike="noStrike" cap="none" dirty="0">
                 <a:solidFill>
                   <a:srgbClr val="000000"/>
                 </a:solidFill>
@@ -18908,7 +18895,7 @@
               </a:rPr>
               <a:t># bending rigidity </a:t>
             </a:r>
-            <a:endParaRPr sz="1800" b="0" i="0" u="none" strike="noStrike" cap="none">
+            <a:endParaRPr sz="1800" b="0" i="0" u="none" strike="noStrike" cap="none" dirty="0">
               <a:solidFill>
                 <a:schemeClr val="dk1"/>
               </a:solidFill>
@@ -18933,7 +18920,7 @@
               <a:buNone/>
             </a:pPr>
             <a:r>
-              <a:rPr lang="en" sz="1600" b="0" i="0" u="none" strike="noStrike" cap="none">
+              <a:rPr lang="en" sz="1600" b="0" i="0" u="none" strike="noStrike" cap="none" dirty="0">
                 <a:solidFill>
                   <a:srgbClr val="000000"/>
                 </a:solidFill>
@@ -18944,7 +18931,7 @@
               </a:rPr>
               <a:t>i_2 j_2 k_2 kappa_2 </a:t>
             </a:r>
-            <a:endParaRPr sz="1800" b="0" i="0" u="none" strike="noStrike" cap="none">
+            <a:endParaRPr sz="1800" b="0" i="0" u="none" strike="noStrike" cap="none" dirty="0">
               <a:solidFill>
                 <a:schemeClr val="dk1"/>
               </a:solidFill>
@@ -18969,7 +18956,7 @@
               <a:buNone/>
             </a:pPr>
             <a:r>
-              <a:rPr lang="en" sz="1600" b="0" i="0" u="none" strike="noStrike" cap="none">
+              <a:rPr lang="en" sz="1600" b="0" i="0" u="none" strike="noStrike" cap="none" dirty="0">
                 <a:solidFill>
                   <a:srgbClr val="000000"/>
                 </a:solidFill>
@@ -18980,7 +18967,7 @@
               </a:rPr>
               <a:t># first vertex index, second vertex index, third vertex index, </a:t>
             </a:r>
-            <a:endParaRPr sz="1800" b="0" i="0" u="none" strike="noStrike" cap="none">
+            <a:endParaRPr sz="1800" b="0" i="0" u="none" strike="noStrike" cap="none" dirty="0">
               <a:solidFill>
                 <a:schemeClr val="dk1"/>
               </a:solidFill>
@@ -19005,7 +18992,7 @@
               <a:buNone/>
             </a:pPr>
             <a:r>
-              <a:rPr lang="en" sz="1600" b="0" i="0" u="none" strike="noStrike" cap="none">
+              <a:rPr lang="en" sz="1600" b="0" i="0" u="none" strike="noStrike" cap="none" dirty="0">
                 <a:solidFill>
                   <a:srgbClr val="000000"/>
                 </a:solidFill>
@@ -19016,7 +19003,7 @@
               </a:rPr>
               <a:t>#bending rigidity ... </a:t>
             </a:r>
-            <a:endParaRPr sz="1800" b="0" i="0" u="none" strike="noStrike" cap="none">
+            <a:endParaRPr sz="1800" b="0" i="0" u="none" strike="noStrike" cap="none" dirty="0">
               <a:solidFill>
                 <a:schemeClr val="dk1"/>
               </a:solidFill>
@@ -19094,7 +19081,7 @@
               <a:buNone/>
             </a:pPr>
             <a:r>
-              <a:rPr lang="en" sz="1600" b="1" i="0" u="none" strike="noStrike" cap="none">
+              <a:rPr lang="en" sz="1600" b="1" i="0" u="none" strike="noStrike" cap="none" dirty="0">
                 <a:solidFill>
                   <a:srgbClr val="000000"/>
                 </a:solidFill>
@@ -19105,7 +19092,7 @@
               </a:rPr>
               <a:t>Target point file format</a:t>
             </a:r>
-            <a:endParaRPr sz="1800" b="0" i="0" u="none" strike="noStrike" cap="none">
+            <a:endParaRPr sz="1800" b="0" i="0" u="none" strike="noStrike" cap="none" dirty="0">
               <a:solidFill>
                 <a:schemeClr val="dk1"/>
               </a:solidFill>
@@ -19125,7 +19112,7 @@
               </a:spcAft>
               <a:buNone/>
             </a:pPr>
-            <a:endParaRPr sz="1800" b="0" i="0" u="none" strike="noStrike" cap="none">
+            <a:endParaRPr sz="1800" b="0" i="0" u="none" strike="noStrike" cap="none" dirty="0">
               <a:solidFill>
                 <a:schemeClr val="dk1"/>
               </a:solidFill>
@@ -19150,7 +19137,7 @@
               <a:buNone/>
             </a:pPr>
             <a:r>
-              <a:rPr lang="en" sz="1600" b="0" i="0" u="none" strike="noStrike" cap="none">
+              <a:rPr lang="en" sz="1600" b="0" i="0" u="none" strike="noStrike" cap="none" dirty="0">
                 <a:solidFill>
                   <a:srgbClr val="000000"/>
                 </a:solidFill>
@@ -19161,7 +19148,7 @@
               </a:rPr>
               <a:t>Target point input files end with the extension ".target" and have the following format:</a:t>
             </a:r>
-            <a:endParaRPr sz="1800" b="0" i="0" u="none" strike="noStrike" cap="none">
+            <a:endParaRPr sz="1800" b="0" i="0" u="none" strike="noStrike" cap="none" dirty="0">
               <a:solidFill>
                 <a:schemeClr val="dk1"/>
               </a:solidFill>
@@ -19181,7 +19168,7 @@
               </a:spcAft>
               <a:buNone/>
             </a:pPr>
-            <a:endParaRPr sz="1800" b="0" i="0" u="none" strike="noStrike" cap="none">
+            <a:endParaRPr sz="1800" b="0" i="0" u="none" strike="noStrike" cap="none" dirty="0">
               <a:solidFill>
                 <a:schemeClr val="dk1"/>
               </a:solidFill>
@@ -19206,7 +19193,7 @@
               <a:buNone/>
             </a:pPr>
             <a:r>
-              <a:rPr lang="en" sz="1400" b="0" i="0" u="none" strike="noStrike" cap="none">
+              <a:rPr lang="en" sz="1400" b="0" i="0" u="none" strike="noStrike" cap="none" dirty="0">
                 <a:solidFill>
                   <a:srgbClr val="000000"/>
                 </a:solidFill>
@@ -19217,7 +19204,7 @@
               </a:rPr>
               <a:t>M # number of target points in the file </a:t>
             </a:r>
-            <a:endParaRPr sz="1800" b="0" i="0" u="none" strike="noStrike" cap="none">
+            <a:endParaRPr sz="1800" b="0" i="0" u="none" strike="noStrike" cap="none" dirty="0">
               <a:solidFill>
                 <a:schemeClr val="dk1"/>
               </a:solidFill>
@@ -19242,7 +19229,7 @@
               <a:buNone/>
             </a:pPr>
             <a:r>
-              <a:rPr lang="en" sz="1400" b="0" i="0" u="none" strike="noStrike" cap="none">
+              <a:rPr lang="en" sz="1400" b="0" i="0" u="none" strike="noStrike" cap="none" dirty="0">
                 <a:solidFill>
                   <a:srgbClr val="000000"/>
                 </a:solidFill>
@@ -19253,7 +19240,7 @@
               </a:rPr>
               <a:t>i_0 kappa_0 eta_0 </a:t>
             </a:r>
-            <a:endParaRPr sz="1800" b="0" i="0" u="none" strike="noStrike" cap="none">
+            <a:endParaRPr sz="1800" b="0" i="0" u="none" strike="noStrike" cap="none" dirty="0">
               <a:solidFill>
                 <a:schemeClr val="dk1"/>
               </a:solidFill>
@@ -19278,7 +19265,7 @@
               <a:buNone/>
             </a:pPr>
             <a:r>
-              <a:rPr lang="en" sz="1400" b="0" i="0" u="none" strike="noStrike" cap="none">
+              <a:rPr lang="en" sz="1400" b="0" i="0" u="none" strike="noStrike" cap="none" dirty="0">
                 <a:solidFill>
                   <a:srgbClr val="000000"/>
                 </a:solidFill>
@@ -19289,7 +19276,7 @@
               </a:rPr>
               <a:t># vertex index, penalty spring constant, penalty damping coefficient </a:t>
             </a:r>
-            <a:endParaRPr sz="1800" b="0" i="0" u="none" strike="noStrike" cap="none">
+            <a:endParaRPr sz="1800" b="0" i="0" u="none" strike="noStrike" cap="none" dirty="0">
               <a:solidFill>
                 <a:schemeClr val="dk1"/>
               </a:solidFill>
@@ -19314,7 +19301,7 @@
               <a:buNone/>
             </a:pPr>
             <a:r>
-              <a:rPr lang="en" sz="1400" b="0" i="0" u="none" strike="noStrike" cap="none">
+              <a:rPr lang="en" sz="1400" b="0" i="0" u="none" strike="noStrike" cap="none" dirty="0">
                 <a:solidFill>
                   <a:srgbClr val="000000"/>
                 </a:solidFill>
@@ -19325,7 +19312,7 @@
               </a:rPr>
               <a:t>i_1 kappa_1 eta_1 </a:t>
             </a:r>
-            <a:endParaRPr sz="1800" b="0" i="0" u="none" strike="noStrike" cap="none">
+            <a:endParaRPr sz="1800" b="0" i="0" u="none" strike="noStrike" cap="none" dirty="0">
               <a:solidFill>
                 <a:schemeClr val="dk1"/>
               </a:solidFill>
@@ -19350,7 +19337,7 @@
               <a:buNone/>
             </a:pPr>
             <a:r>
-              <a:rPr lang="en" sz="1400" b="0" i="0" u="none" strike="noStrike" cap="none">
+              <a:rPr lang="en" sz="1400" b="0" i="0" u="none" strike="noStrike" cap="none" dirty="0">
                 <a:solidFill>
                   <a:srgbClr val="000000"/>
                 </a:solidFill>
@@ -19361,7 +19348,7 @@
               </a:rPr>
               <a:t>i_2 kappa_2 eta_2 </a:t>
             </a:r>
-            <a:endParaRPr sz="1800" b="0" i="0" u="none" strike="noStrike" cap="none">
+            <a:endParaRPr sz="1800" b="0" i="0" u="none" strike="noStrike" cap="none" dirty="0">
               <a:solidFill>
                 <a:schemeClr val="dk1"/>
               </a:solidFill>
@@ -19386,7 +19373,7 @@
               <a:buNone/>
             </a:pPr>
             <a:r>
-              <a:rPr lang="en" sz="1400" b="0" i="0" u="none" strike="noStrike" cap="none">
+              <a:rPr lang="en" sz="1400" b="0" i="0" u="none" strike="noStrike" cap="none" dirty="0">
                 <a:solidFill>
                   <a:srgbClr val="000000"/>
                 </a:solidFill>
@@ -19397,7 +19384,7 @@
               </a:rPr>
               <a:t>... </a:t>
             </a:r>
-            <a:endParaRPr sz="1800" b="0" i="0" u="none" strike="noStrike" cap="none">
+            <a:endParaRPr sz="1800" b="0" i="0" u="none" strike="noStrike" cap="none" dirty="0">
               <a:solidFill>
                 <a:schemeClr val="dk1"/>
               </a:solidFill>
@@ -19417,7 +19404,7 @@
               </a:spcAft>
               <a:buNone/>
             </a:pPr>
-            <a:endParaRPr sz="1800" b="0" i="0" u="none" strike="noStrike" cap="none">
+            <a:endParaRPr sz="1800" b="0" i="0" u="none" strike="noStrike" cap="none" dirty="0">
               <a:solidFill>
                 <a:schemeClr val="dk1"/>
               </a:solidFill>
@@ -19442,7 +19429,7 @@
               <a:buNone/>
             </a:pPr>
             <a:r>
-              <a:rPr lang="en" sz="1600" b="1" i="0" u="none" strike="noStrike" cap="none">
+              <a:rPr lang="en" sz="1600" b="1" i="0" u="none" strike="noStrike" cap="none" dirty="0">
                 <a:solidFill>
                   <a:srgbClr val="000000"/>
                 </a:solidFill>
@@ -19453,7 +19440,7 @@
               </a:rPr>
               <a:t>Note:</a:t>
             </a:r>
-            <a:endParaRPr sz="1800" b="0" i="0" u="none" strike="noStrike" cap="none">
+            <a:endParaRPr sz="1800" b="0" i="0" u="none" strike="noStrike" cap="none" dirty="0">
               <a:solidFill>
                 <a:schemeClr val="dk1"/>
               </a:solidFill>
@@ -19478,7 +19465,7 @@
               <a:buNone/>
             </a:pPr>
             <a:r>
-              <a:rPr lang="en" sz="1600" b="0" i="0" u="none" strike="noStrike" cap="none">
+              <a:rPr lang="en" sz="1600" b="0" i="0" u="none" strike="noStrike" cap="none" dirty="0">
                 <a:solidFill>
                   <a:srgbClr val="000000"/>
                 </a:solidFill>
@@ -19490,7 +19477,7 @@
               <a:t>Target points are anchored to their </a:t>
             </a:r>
             <a:r>
-              <a:rPr lang="en" sz="1600" b="0" i="1" u="none" strike="noStrike" cap="none">
+              <a:rPr lang="en" sz="1600" b="0" i="1" u="none" strike="noStrike" cap="none" dirty="0">
                 <a:solidFill>
                   <a:srgbClr val="000000"/>
                 </a:solidFill>
@@ -19502,7 +19489,7 @@
               <a:t>initial</a:t>
             </a:r>
             <a:r>
-              <a:rPr lang="en" sz="1600" b="0" i="0" u="none" strike="noStrike" cap="none">
+              <a:rPr lang="en" sz="1600" b="0" i="0" u="none" strike="noStrike" cap="none" dirty="0">
                 <a:solidFill>
                   <a:srgbClr val="000000"/>
                 </a:solidFill>
@@ -19513,7 +19500,7 @@
               </a:rPr>
               <a:t> positions by linear springs with the specified spring constants and with zero resting lengths. Consequently, target points approximately enforce internal Dirichlet boundary conditions. The penalty parameter provides control over the energetic penalty imposed when the position of the Lagrangian immersed boundary point deviates from that of its specified fixed location.</a:t>
             </a:r>
-            <a:endParaRPr sz="1800" b="0" i="0" u="none" strike="noStrike" cap="none">
+            <a:endParaRPr sz="1800" b="0" i="0" u="none" strike="noStrike" cap="none" dirty="0">
               <a:solidFill>
                 <a:schemeClr val="dk1"/>
               </a:solidFill>
@@ -19538,7 +19525,7 @@
               <a:buNone/>
             </a:pPr>
             <a:r>
-              <a:rPr lang="en" sz="1600" b="0" i="0" u="none" strike="noStrike" cap="none">
+              <a:rPr lang="en" sz="1600" b="0" i="0" u="none" strike="noStrike" cap="none" dirty="0">
                 <a:solidFill>
                   <a:srgbClr val="000000"/>
                 </a:solidFill>
@@ -19550,7 +19537,7 @@
               <a:t>Damping coefficients   </a:t>
             </a:r>
             <a:r>
-              <a:rPr lang="en" sz="1100" b="0" i="0" u="none" strike="noStrike" cap="none">
+              <a:rPr lang="en" sz="1100" b="0" i="0" u="none" strike="noStrike" cap="none" dirty="0">
                 <a:solidFill>
                   <a:srgbClr val="000000"/>
                 </a:solidFill>
@@ -19562,7 +19549,7 @@
               <a:t> </a:t>
             </a:r>
             <a:r>
-              <a:rPr lang="en" sz="1600" b="0" i="0" u="none" strike="noStrike" cap="none">
+              <a:rPr lang="en" sz="1600" b="0" i="0" u="none" strike="noStrike" cap="none" dirty="0">
                 <a:solidFill>
                   <a:srgbClr val="000000"/>
                 </a:solidFill>
@@ -19574,7 +19561,7 @@
               <a:t>    are optional and are set to </a:t>
             </a:r>
             <a:r>
-              <a:rPr lang="en" sz="1600" b="0" i="1" u="none" strike="noStrike" cap="none">
+              <a:rPr lang="en" sz="1600" b="0" i="1" u="none" strike="noStrike" cap="none" dirty="0">
                 <a:solidFill>
                   <a:srgbClr val="000000"/>
                 </a:solidFill>
@@ -19586,7 +19573,7 @@
               <a:t>0.0</a:t>
             </a:r>
             <a:r>
-              <a:rPr lang="en" sz="1600" b="0" i="0" u="none" strike="noStrike" cap="none">
+              <a:rPr lang="en" sz="1600" b="0" i="0" u="none" strike="noStrike" cap="none" dirty="0">
                 <a:solidFill>
                   <a:srgbClr val="000000"/>
                 </a:solidFill>
@@ -19597,7 +19584,7 @@
               </a:rPr>
               <a:t> if not supplied. Target points are "anchored" in place using Kelvin-Voigt viscoelastic elements.</a:t>
             </a:r>
-            <a:endParaRPr sz="1800" b="0" i="0" u="none" strike="noStrike" cap="none">
+            <a:endParaRPr sz="1800" b="0" i="0" u="none" strike="noStrike" cap="none" dirty="0">
               <a:solidFill>
                 <a:schemeClr val="dk1"/>
               </a:solidFill>
@@ -19617,7 +19604,7 @@
               </a:spcAft>
               <a:buNone/>
             </a:pPr>
-            <a:endParaRPr sz="1800" b="0" i="0" u="none" strike="noStrike" cap="none">
+            <a:endParaRPr sz="1800" b="0" i="0" u="none" strike="noStrike" cap="none" dirty="0">
               <a:solidFill>
                 <a:schemeClr val="dk1"/>
               </a:solidFill>
@@ -19637,7 +19624,7 @@
               </a:spcAft>
               <a:buNone/>
             </a:pPr>
-            <a:endParaRPr sz="1800" b="0" i="0" u="none" strike="noStrike" cap="none">
+            <a:endParaRPr sz="1800" b="0" i="0" u="none" strike="noStrike" cap="none" dirty="0">
               <a:solidFill>
                 <a:schemeClr val="dk1"/>
               </a:solidFill>

</xml_diff>